<commit_message>
Update code and figures for quantile analysis and color distributions
</commit_message>
<xml_diff>
--- a/CrackTeeth2020/Paper/Figures.pptx
+++ b/CrackTeeth2020/Paper/Figures.pptx
@@ -9,6 +9,7 @@
     <p:sldId id="258" r:id="rId3"/>
     <p:sldId id="259" r:id="rId4"/>
     <p:sldId id="257" r:id="rId5"/>
+    <p:sldId id="260" r:id="rId6"/>
   </p:sldIdLst>
   <p:sldSz cx="12192000" cy="6858000"/>
   <p:notesSz cx="6858000" cy="9144000"/>
@@ -3680,10 +3681,10 @@
       </p:grpSpPr>
       <p:pic>
         <p:nvPicPr>
-          <p:cNvPr id="7" name="Picture 6">
-            <a:extLst>
-              <a:ext uri="{FF2B5EF4-FFF2-40B4-BE49-F238E27FC236}">
-                <a16:creationId xmlns:a16="http://schemas.microsoft.com/office/drawing/2014/main" id="{12FBC8F0-25F6-4715-BCB1-CD5918E70AEC}"/>
+          <p:cNvPr id="3" name="Picture 2">
+            <a:extLst>
+              <a:ext uri="{FF2B5EF4-FFF2-40B4-BE49-F238E27FC236}">
+                <a16:creationId xmlns:a16="http://schemas.microsoft.com/office/drawing/2014/main" id="{A41DBCD6-3259-426E-8451-40922F148020}"/>
               </a:ext>
             </a:extLst>
           </p:cNvPr>
@@ -3700,13 +3701,13 @@
               </a:ext>
             </a:extLst>
           </a:blip>
-          <a:srcRect l="4657" r="51302"/>
+          <a:srcRect r="51626"/>
           <a:stretch/>
         </p:blipFill>
         <p:spPr>
           <a:xfrm>
-            <a:off x="4655512" y="0"/>
-            <a:ext cx="3438950" cy="3295216"/>
+            <a:off x="878231" y="0"/>
+            <a:ext cx="3777281" cy="3295216"/>
           </a:xfrm>
           <a:prstGeom prst="rect">
             <a:avLst/>
@@ -3715,46 +3716,10 @@
       </p:pic>
       <p:pic>
         <p:nvPicPr>
-          <p:cNvPr id="2" name="Picture 1">
-            <a:extLst>
-              <a:ext uri="{FF2B5EF4-FFF2-40B4-BE49-F238E27FC236}">
-                <a16:creationId xmlns:a16="http://schemas.microsoft.com/office/drawing/2014/main" id="{2A50A07F-2EDF-4455-9EF1-EAA57F5FC6D0}"/>
-              </a:ext>
-            </a:extLst>
-          </p:cNvPr>
-          <p:cNvPicPr>
-            <a:picLocks noChangeAspect="1"/>
-          </p:cNvPicPr>
-          <p:nvPr/>
-        </p:nvPicPr>
-        <p:blipFill>
-          <a:blip r:embed="rId2">
-            <a:extLst>
-              <a:ext uri="{28A0092B-C50C-407E-A947-70E740481C1C}">
-                <a14:useLocalDpi xmlns:a14="http://schemas.microsoft.com/office/drawing/2010/main" val="0"/>
-              </a:ext>
-            </a:extLst>
-          </a:blip>
-          <a:stretch>
-            <a:fillRect/>
-          </a:stretch>
-        </p:blipFill>
-        <p:spPr>
-          <a:xfrm>
-            <a:off x="878231" y="3562784"/>
-            <a:ext cx="7808570" cy="3295216"/>
-          </a:xfrm>
-          <a:prstGeom prst="rect">
-            <a:avLst/>
-          </a:prstGeom>
-        </p:spPr>
-      </p:pic>
-      <p:pic>
-        <p:nvPicPr>
-          <p:cNvPr id="3" name="Picture 2">
-            <a:extLst>
-              <a:ext uri="{FF2B5EF4-FFF2-40B4-BE49-F238E27FC236}">
-                <a16:creationId xmlns:a16="http://schemas.microsoft.com/office/drawing/2014/main" id="{A41DBCD6-3259-426E-8451-40922F148020}"/>
+          <p:cNvPr id="7" name="Picture 6">
+            <a:extLst>
+              <a:ext uri="{FF2B5EF4-FFF2-40B4-BE49-F238E27FC236}">
+                <a16:creationId xmlns:a16="http://schemas.microsoft.com/office/drawing/2014/main" id="{12FBC8F0-25F6-4715-BCB1-CD5918E70AEC}"/>
               </a:ext>
             </a:extLst>
           </p:cNvPr>
@@ -3771,13 +3736,49 @@
               </a:ext>
             </a:extLst>
           </a:blip>
-          <a:srcRect r="51626"/>
+          <a:srcRect l="4657" r="51302"/>
           <a:stretch/>
         </p:blipFill>
         <p:spPr>
           <a:xfrm>
-            <a:off x="878231" y="0"/>
-            <a:ext cx="3777281" cy="3295216"/>
+            <a:off x="4655512" y="0"/>
+            <a:ext cx="3438950" cy="3295216"/>
+          </a:xfrm>
+          <a:prstGeom prst="rect">
+            <a:avLst/>
+          </a:prstGeom>
+        </p:spPr>
+      </p:pic>
+      <p:pic>
+        <p:nvPicPr>
+          <p:cNvPr id="2" name="Picture 1">
+            <a:extLst>
+              <a:ext uri="{FF2B5EF4-FFF2-40B4-BE49-F238E27FC236}">
+                <a16:creationId xmlns:a16="http://schemas.microsoft.com/office/drawing/2014/main" id="{2A50A07F-2EDF-4455-9EF1-EAA57F5FC6D0}"/>
+              </a:ext>
+            </a:extLst>
+          </p:cNvPr>
+          <p:cNvPicPr>
+            <a:picLocks noChangeAspect="1"/>
+          </p:cNvPicPr>
+          <p:nvPr/>
+        </p:nvPicPr>
+        <p:blipFill>
+          <a:blip r:embed="rId3">
+            <a:extLst>
+              <a:ext uri="{28A0092B-C50C-407E-A947-70E740481C1C}">
+                <a14:useLocalDpi xmlns:a14="http://schemas.microsoft.com/office/drawing/2010/main" val="0"/>
+              </a:ext>
+            </a:extLst>
+          </a:blip>
+          <a:stretch>
+            <a:fillRect/>
+          </a:stretch>
+        </p:blipFill>
+        <p:spPr>
+          <a:xfrm>
+            <a:off x="878231" y="3562784"/>
+            <a:ext cx="7808570" cy="3295216"/>
           </a:xfrm>
           <a:prstGeom prst="rect">
             <a:avLst/>
@@ -3875,7 +3876,7 @@
           <p:nvPr/>
         </p:nvPicPr>
         <p:blipFill rotWithShape="1">
-          <a:blip r:embed="rId3">
+          <a:blip r:embed="rId2">
             <a:extLst>
               <a:ext uri="{28A0092B-C50C-407E-A947-70E740481C1C}">
                 <a14:useLocalDpi xmlns:a14="http://schemas.microsoft.com/office/drawing/2010/main" val="0"/>
@@ -3979,6 +3980,518 @@
               </a:rPr>
               <a:t>-CBCT</a:t>
             </a:r>
+          </a:p>
+        </p:txBody>
+      </p:sp>
+      <p:sp>
+        <p:nvSpPr>
+          <p:cNvPr id="10" name="TextBox 9">
+            <a:extLst>
+              <a:ext uri="{FF2B5EF4-FFF2-40B4-BE49-F238E27FC236}">
+                <a16:creationId xmlns:a16="http://schemas.microsoft.com/office/drawing/2014/main" id="{4020D532-F256-4F05-BC3D-78D8C1D973B0}"/>
+              </a:ext>
+            </a:extLst>
+          </p:cNvPr>
+          <p:cNvSpPr txBox="1"/>
+          <p:nvPr/>
+        </p:nvSpPr>
+        <p:spPr>
+          <a:xfrm>
+            <a:off x="5409212" y="2163"/>
+            <a:ext cx="2418739" cy="307777"/>
+          </a:xfrm>
+          <a:prstGeom prst="rect">
+            <a:avLst/>
+          </a:prstGeom>
+          <a:solidFill>
+            <a:schemeClr val="bg1"/>
+          </a:solidFill>
+        </p:spPr>
+        <p:txBody>
+          <a:bodyPr wrap="none" rtlCol="0">
+            <a:spAutoFit/>
+          </a:bodyPr>
+          <a:lstStyle/>
+          <a:p>
+            <a:r>
+              <a:rPr lang="en-US" sz="1400" b="1" dirty="0">
+                <a:latin typeface="Arial" panose="020B0604020202020204" pitchFamily="34" charset="0"/>
+                <a:cs typeface="Arial" panose="020B0604020202020204" pitchFamily="34" charset="0"/>
+              </a:rPr>
+              <a:t>Distribution of </a:t>
+            </a:r>
+            <a:r>
+              <a:rPr lang="en-US" sz="1400" b="1" dirty="0" err="1">
+                <a:latin typeface="Arial" panose="020B0604020202020204" pitchFamily="34" charset="0"/>
+                <a:cs typeface="Arial" panose="020B0604020202020204" pitchFamily="34" charset="0"/>
+              </a:rPr>
+              <a:t>NumVoxels</a:t>
+            </a:r>
+            <a:endParaRPr lang="en-US" sz="1400" b="1" dirty="0">
+              <a:latin typeface="Arial" panose="020B0604020202020204" pitchFamily="34" charset="0"/>
+              <a:cs typeface="Arial" panose="020B0604020202020204" pitchFamily="34" charset="0"/>
+            </a:endParaRPr>
+          </a:p>
+        </p:txBody>
+      </p:sp>
+      <p:sp>
+        <p:nvSpPr>
+          <p:cNvPr id="11" name="TextBox 10">
+            <a:extLst>
+              <a:ext uri="{FF2B5EF4-FFF2-40B4-BE49-F238E27FC236}">
+                <a16:creationId xmlns:a16="http://schemas.microsoft.com/office/drawing/2014/main" id="{D2ECB835-7F69-486A-A352-64E801787593}"/>
+              </a:ext>
+            </a:extLst>
+          </p:cNvPr>
+          <p:cNvSpPr txBox="1"/>
+          <p:nvPr/>
+        </p:nvSpPr>
+        <p:spPr>
+          <a:xfrm>
+            <a:off x="1993178" y="-7306"/>
+            <a:ext cx="2418739" cy="307777"/>
+          </a:xfrm>
+          <a:prstGeom prst="rect">
+            <a:avLst/>
+          </a:prstGeom>
+          <a:solidFill>
+            <a:schemeClr val="bg1"/>
+          </a:solidFill>
+        </p:spPr>
+        <p:txBody>
+          <a:bodyPr wrap="none" rtlCol="0">
+            <a:spAutoFit/>
+          </a:bodyPr>
+          <a:lstStyle/>
+          <a:p>
+            <a:r>
+              <a:rPr lang="en-US" sz="1400" b="1" dirty="0">
+                <a:latin typeface="Arial" panose="020B0604020202020204" pitchFamily="34" charset="0"/>
+                <a:cs typeface="Arial" panose="020B0604020202020204" pitchFamily="34" charset="0"/>
+              </a:rPr>
+              <a:t>Distribution of </a:t>
+            </a:r>
+            <a:r>
+              <a:rPr lang="en-US" sz="1400" b="1" dirty="0" err="1">
+                <a:latin typeface="Arial" panose="020B0604020202020204" pitchFamily="34" charset="0"/>
+                <a:cs typeface="Arial" panose="020B0604020202020204" pitchFamily="34" charset="0"/>
+              </a:rPr>
+              <a:t>NumVoxels</a:t>
+            </a:r>
+            <a:endParaRPr lang="en-US" sz="1400" b="1" dirty="0">
+              <a:latin typeface="Arial" panose="020B0604020202020204" pitchFamily="34" charset="0"/>
+              <a:cs typeface="Arial" panose="020B0604020202020204" pitchFamily="34" charset="0"/>
+            </a:endParaRPr>
+          </a:p>
+        </p:txBody>
+      </p:sp>
+      <p:sp>
+        <p:nvSpPr>
+          <p:cNvPr id="12" name="TextBox 11">
+            <a:extLst>
+              <a:ext uri="{FF2B5EF4-FFF2-40B4-BE49-F238E27FC236}">
+                <a16:creationId xmlns:a16="http://schemas.microsoft.com/office/drawing/2014/main" id="{A4567348-5268-4E4D-893C-A28EEC53D16D}"/>
+              </a:ext>
+            </a:extLst>
+          </p:cNvPr>
+          <p:cNvSpPr txBox="1"/>
+          <p:nvPr/>
+        </p:nvSpPr>
+        <p:spPr>
+          <a:xfrm>
+            <a:off x="5264471" y="3527495"/>
+            <a:ext cx="3003836" cy="307777"/>
+          </a:xfrm>
+          <a:prstGeom prst="rect">
+            <a:avLst/>
+          </a:prstGeom>
+          <a:solidFill>
+            <a:schemeClr val="bg1"/>
+          </a:solidFill>
+        </p:spPr>
+        <p:txBody>
+          <a:bodyPr wrap="none" rtlCol="0">
+            <a:spAutoFit/>
+          </a:bodyPr>
+          <a:lstStyle/>
+          <a:p>
+            <a:r>
+              <a:rPr lang="en-US" sz="1400" b="1" dirty="0">
+                <a:latin typeface="Arial" panose="020B0604020202020204" pitchFamily="34" charset="0"/>
+                <a:cs typeface="Arial" panose="020B0604020202020204" pitchFamily="34" charset="0"/>
+              </a:rPr>
+              <a:t>Distribution of log10(</a:t>
+            </a:r>
+            <a:r>
+              <a:rPr lang="en-US" sz="1400" b="1" dirty="0" err="1">
+                <a:latin typeface="Arial" panose="020B0604020202020204" pitchFamily="34" charset="0"/>
+                <a:cs typeface="Arial" panose="020B0604020202020204" pitchFamily="34" charset="0"/>
+              </a:rPr>
+              <a:t>NumVoxels</a:t>
+            </a:r>
+            <a:r>
+              <a:rPr lang="en-US" sz="1400" b="1" dirty="0">
+                <a:latin typeface="Arial" panose="020B0604020202020204" pitchFamily="34" charset="0"/>
+                <a:cs typeface="Arial" panose="020B0604020202020204" pitchFamily="34" charset="0"/>
+              </a:rPr>
+              <a:t>)</a:t>
+            </a:r>
+          </a:p>
+        </p:txBody>
+      </p:sp>
+      <p:sp>
+        <p:nvSpPr>
+          <p:cNvPr id="13" name="TextBox 12">
+            <a:extLst>
+              <a:ext uri="{FF2B5EF4-FFF2-40B4-BE49-F238E27FC236}">
+                <a16:creationId xmlns:a16="http://schemas.microsoft.com/office/drawing/2014/main" id="{DA1A4D60-39F0-4387-964E-9A9C0E1A1250}"/>
+              </a:ext>
+            </a:extLst>
+          </p:cNvPr>
+          <p:cNvSpPr txBox="1"/>
+          <p:nvPr/>
+        </p:nvSpPr>
+        <p:spPr>
+          <a:xfrm>
+            <a:off x="5252114" y="3513798"/>
+            <a:ext cx="3063146" cy="307777"/>
+          </a:xfrm>
+          <a:prstGeom prst="rect">
+            <a:avLst/>
+          </a:prstGeom>
+          <a:solidFill>
+            <a:schemeClr val="bg1"/>
+          </a:solidFill>
+        </p:spPr>
+        <p:txBody>
+          <a:bodyPr wrap="none" rtlCol="0">
+            <a:spAutoFit/>
+          </a:bodyPr>
+          <a:lstStyle/>
+          <a:p>
+            <a:r>
+              <a:rPr lang="en-US" sz="1400" b="1" dirty="0">
+                <a:latin typeface="Arial" panose="020B0604020202020204" pitchFamily="34" charset="0"/>
+                <a:cs typeface="Arial" panose="020B0604020202020204" pitchFamily="34" charset="0"/>
+              </a:rPr>
+              <a:t>Distribution of Log</a:t>
+            </a:r>
+            <a:r>
+              <a:rPr lang="en-US" sz="1400" b="1" baseline="-25000" dirty="0">
+                <a:latin typeface="Arial" panose="020B0604020202020204" pitchFamily="34" charset="0"/>
+                <a:cs typeface="Arial" panose="020B0604020202020204" pitchFamily="34" charset="0"/>
+              </a:rPr>
+              <a:t>10</a:t>
+            </a:r>
+            <a:r>
+              <a:rPr lang="en-US" sz="1400" b="1" dirty="0">
+                <a:latin typeface="Arial" panose="020B0604020202020204" pitchFamily="34" charset="0"/>
+                <a:cs typeface="Arial" panose="020B0604020202020204" pitchFamily="34" charset="0"/>
+              </a:rPr>
+              <a:t>(</a:t>
+            </a:r>
+            <a:r>
+              <a:rPr lang="en-US" sz="1400" b="1" dirty="0" err="1">
+                <a:latin typeface="Arial" panose="020B0604020202020204" pitchFamily="34" charset="0"/>
+                <a:cs typeface="Arial" panose="020B0604020202020204" pitchFamily="34" charset="0"/>
+              </a:rPr>
+              <a:t>NumVoxels</a:t>
+            </a:r>
+            <a:r>
+              <a:rPr lang="en-US" sz="1400" b="1" dirty="0">
+                <a:latin typeface="Arial" panose="020B0604020202020204" pitchFamily="34" charset="0"/>
+                <a:cs typeface="Arial" panose="020B0604020202020204" pitchFamily="34" charset="0"/>
+              </a:rPr>
+              <a:t>)</a:t>
+            </a:r>
+          </a:p>
+        </p:txBody>
+      </p:sp>
+      <p:sp>
+        <p:nvSpPr>
+          <p:cNvPr id="14" name="TextBox 13">
+            <a:extLst>
+              <a:ext uri="{FF2B5EF4-FFF2-40B4-BE49-F238E27FC236}">
+                <a16:creationId xmlns:a16="http://schemas.microsoft.com/office/drawing/2014/main" id="{26EBB427-C91F-41F7-8752-A0CAECE167F8}"/>
+              </a:ext>
+            </a:extLst>
+          </p:cNvPr>
+          <p:cNvSpPr txBox="1"/>
+          <p:nvPr/>
+        </p:nvSpPr>
+        <p:spPr>
+          <a:xfrm>
+            <a:off x="1844616" y="3501441"/>
+            <a:ext cx="3063146" cy="307777"/>
+          </a:xfrm>
+          <a:prstGeom prst="rect">
+            <a:avLst/>
+          </a:prstGeom>
+          <a:solidFill>
+            <a:schemeClr val="bg1"/>
+          </a:solidFill>
+        </p:spPr>
+        <p:txBody>
+          <a:bodyPr wrap="none" rtlCol="0">
+            <a:spAutoFit/>
+          </a:bodyPr>
+          <a:lstStyle/>
+          <a:p>
+            <a:r>
+              <a:rPr lang="en-US" sz="1400" b="1" dirty="0">
+                <a:latin typeface="Arial" panose="020B0604020202020204" pitchFamily="34" charset="0"/>
+                <a:cs typeface="Arial" panose="020B0604020202020204" pitchFamily="34" charset="0"/>
+              </a:rPr>
+              <a:t>Distribution of Log</a:t>
+            </a:r>
+            <a:r>
+              <a:rPr lang="en-US" sz="1400" b="1" baseline="-25000" dirty="0">
+                <a:latin typeface="Arial" panose="020B0604020202020204" pitchFamily="34" charset="0"/>
+                <a:cs typeface="Arial" panose="020B0604020202020204" pitchFamily="34" charset="0"/>
+              </a:rPr>
+              <a:t>10</a:t>
+            </a:r>
+            <a:r>
+              <a:rPr lang="en-US" sz="1400" b="1" dirty="0">
+                <a:latin typeface="Arial" panose="020B0604020202020204" pitchFamily="34" charset="0"/>
+                <a:cs typeface="Arial" panose="020B0604020202020204" pitchFamily="34" charset="0"/>
+              </a:rPr>
+              <a:t>(</a:t>
+            </a:r>
+            <a:r>
+              <a:rPr lang="en-US" sz="1400" b="1" dirty="0" err="1">
+                <a:latin typeface="Arial" panose="020B0604020202020204" pitchFamily="34" charset="0"/>
+                <a:cs typeface="Arial" panose="020B0604020202020204" pitchFamily="34" charset="0"/>
+              </a:rPr>
+              <a:t>NumVoxels</a:t>
+            </a:r>
+            <a:r>
+              <a:rPr lang="en-US" sz="1400" b="1" dirty="0">
+                <a:latin typeface="Arial" panose="020B0604020202020204" pitchFamily="34" charset="0"/>
+                <a:cs typeface="Arial" panose="020B0604020202020204" pitchFamily="34" charset="0"/>
+              </a:rPr>
+              <a:t>)</a:t>
+            </a:r>
+          </a:p>
+        </p:txBody>
+      </p:sp>
+      <p:sp>
+        <p:nvSpPr>
+          <p:cNvPr id="15" name="Rectangle 14">
+            <a:extLst>
+              <a:ext uri="{FF2B5EF4-FFF2-40B4-BE49-F238E27FC236}">
+                <a16:creationId xmlns:a16="http://schemas.microsoft.com/office/drawing/2014/main" id="{C6410C1D-DA0F-4812-A598-43B0B9FC0274}"/>
+              </a:ext>
+            </a:extLst>
+          </p:cNvPr>
+          <p:cNvSpPr/>
+          <p:nvPr/>
+        </p:nvSpPr>
+        <p:spPr>
+          <a:xfrm rot="16200000">
+            <a:off x="4234910" y="1394863"/>
+            <a:ext cx="1091709" cy="307777"/>
+          </a:xfrm>
+          <a:prstGeom prst="rect">
+            <a:avLst/>
+          </a:prstGeom>
+          <a:solidFill>
+            <a:schemeClr val="bg1"/>
+          </a:solidFill>
+        </p:spPr>
+        <p:txBody>
+          <a:bodyPr wrap="none">
+            <a:spAutoFit/>
+          </a:bodyPr>
+          <a:lstStyle/>
+          <a:p>
+            <a:r>
+              <a:rPr lang="en-US" sz="1400" dirty="0" err="1">
+                <a:latin typeface="Arial" panose="020B0604020202020204" pitchFamily="34" charset="0"/>
+                <a:cs typeface="Arial" panose="020B0604020202020204" pitchFamily="34" charset="0"/>
+              </a:rPr>
+              <a:t>NumVoxels</a:t>
+            </a:r>
+            <a:endParaRPr lang="en-US" sz="1400" dirty="0"/>
+          </a:p>
+        </p:txBody>
+      </p:sp>
+      <p:sp>
+        <p:nvSpPr>
+          <p:cNvPr id="16" name="Rectangle 15">
+            <a:extLst>
+              <a:ext uri="{FF2B5EF4-FFF2-40B4-BE49-F238E27FC236}">
+                <a16:creationId xmlns:a16="http://schemas.microsoft.com/office/drawing/2014/main" id="{B3D96F82-3B7F-43CB-9D29-2A4D20F04C36}"/>
+              </a:ext>
+            </a:extLst>
+          </p:cNvPr>
+          <p:cNvSpPr/>
+          <p:nvPr/>
+        </p:nvSpPr>
+        <p:spPr>
+          <a:xfrm rot="16200000">
+            <a:off x="820674" y="1449530"/>
+            <a:ext cx="1091709" cy="307777"/>
+          </a:xfrm>
+          <a:prstGeom prst="rect">
+            <a:avLst/>
+          </a:prstGeom>
+          <a:solidFill>
+            <a:schemeClr val="bg1"/>
+          </a:solidFill>
+        </p:spPr>
+        <p:txBody>
+          <a:bodyPr wrap="none">
+            <a:spAutoFit/>
+          </a:bodyPr>
+          <a:lstStyle/>
+          <a:p>
+            <a:r>
+              <a:rPr lang="en-US" sz="1400" dirty="0" err="1">
+                <a:latin typeface="Arial" panose="020B0604020202020204" pitchFamily="34" charset="0"/>
+                <a:cs typeface="Arial" panose="020B0604020202020204" pitchFamily="34" charset="0"/>
+              </a:rPr>
+              <a:t>NumVoxels</a:t>
+            </a:r>
+            <a:endParaRPr lang="en-US" sz="1400" dirty="0"/>
+          </a:p>
+        </p:txBody>
+      </p:sp>
+      <p:sp>
+        <p:nvSpPr>
+          <p:cNvPr id="17" name="Rectangle 16">
+            <a:extLst>
+              <a:ext uri="{FF2B5EF4-FFF2-40B4-BE49-F238E27FC236}">
+                <a16:creationId xmlns:a16="http://schemas.microsoft.com/office/drawing/2014/main" id="{72059E4C-4A6F-418D-840E-0592506CB496}"/>
+              </a:ext>
+            </a:extLst>
+          </p:cNvPr>
+          <p:cNvSpPr/>
+          <p:nvPr/>
+        </p:nvSpPr>
+        <p:spPr>
+          <a:xfrm rot="16200000">
+            <a:off x="622870" y="4883505"/>
+            <a:ext cx="1643142" cy="307777"/>
+          </a:xfrm>
+          <a:prstGeom prst="rect">
+            <a:avLst/>
+          </a:prstGeom>
+          <a:solidFill>
+            <a:schemeClr val="bg1"/>
+          </a:solidFill>
+        </p:spPr>
+        <p:txBody>
+          <a:bodyPr wrap="none">
+            <a:spAutoFit/>
+          </a:bodyPr>
+          <a:lstStyle/>
+          <a:p>
+            <a:r>
+              <a:rPr lang="en-US" sz="1400" dirty="0">
+                <a:latin typeface="Arial" panose="020B0604020202020204" pitchFamily="34" charset="0"/>
+                <a:cs typeface="Arial" panose="020B0604020202020204" pitchFamily="34" charset="0"/>
+              </a:rPr>
+              <a:t>Log</a:t>
+            </a:r>
+            <a:r>
+              <a:rPr lang="en-US" sz="1400" baseline="-25000" dirty="0">
+                <a:latin typeface="Arial" panose="020B0604020202020204" pitchFamily="34" charset="0"/>
+                <a:cs typeface="Arial" panose="020B0604020202020204" pitchFamily="34" charset="0"/>
+              </a:rPr>
+              <a:t>10</a:t>
+            </a:r>
+            <a:r>
+              <a:rPr lang="en-US" sz="1400" dirty="0">
+                <a:latin typeface="Arial" panose="020B0604020202020204" pitchFamily="34" charset="0"/>
+                <a:cs typeface="Arial" panose="020B0604020202020204" pitchFamily="34" charset="0"/>
+              </a:rPr>
+              <a:t>(</a:t>
+            </a:r>
+            <a:r>
+              <a:rPr lang="en-US" sz="1400" dirty="0" err="1">
+                <a:latin typeface="Arial" panose="020B0604020202020204" pitchFamily="34" charset="0"/>
+                <a:cs typeface="Arial" panose="020B0604020202020204" pitchFamily="34" charset="0"/>
+              </a:rPr>
+              <a:t>NumVoxels</a:t>
+            </a:r>
+            <a:r>
+              <a:rPr lang="en-US" sz="1400" dirty="0">
+                <a:latin typeface="Arial" panose="020B0604020202020204" pitchFamily="34" charset="0"/>
+                <a:cs typeface="Arial" panose="020B0604020202020204" pitchFamily="34" charset="0"/>
+              </a:rPr>
+              <a:t>)</a:t>
+            </a:r>
+            <a:endParaRPr lang="en-US" sz="1400" dirty="0"/>
+          </a:p>
+        </p:txBody>
+      </p:sp>
+      <p:sp>
+        <p:nvSpPr>
+          <p:cNvPr id="18" name="Rectangle 17">
+            <a:extLst>
+              <a:ext uri="{FF2B5EF4-FFF2-40B4-BE49-F238E27FC236}">
+                <a16:creationId xmlns:a16="http://schemas.microsoft.com/office/drawing/2014/main" id="{7B9A6B52-9516-4CE3-93AC-C43CDBDF29EF}"/>
+              </a:ext>
+            </a:extLst>
+          </p:cNvPr>
+          <p:cNvSpPr/>
+          <p:nvPr/>
+        </p:nvSpPr>
+        <p:spPr>
+          <a:xfrm rot="16200000">
+            <a:off x="4135007" y="4883505"/>
+            <a:ext cx="1643142" cy="307777"/>
+          </a:xfrm>
+          <a:prstGeom prst="rect">
+            <a:avLst/>
+          </a:prstGeom>
+          <a:solidFill>
+            <a:schemeClr val="bg1"/>
+          </a:solidFill>
+        </p:spPr>
+        <p:txBody>
+          <a:bodyPr wrap="none">
+            <a:spAutoFit/>
+          </a:bodyPr>
+          <a:lstStyle/>
+          <a:p>
+            <a:r>
+              <a:rPr lang="en-US" sz="1400" dirty="0">
+                <a:latin typeface="Arial" panose="020B0604020202020204" pitchFamily="34" charset="0"/>
+                <a:cs typeface="Arial" panose="020B0604020202020204" pitchFamily="34" charset="0"/>
+              </a:rPr>
+              <a:t>Log</a:t>
+            </a:r>
+            <a:r>
+              <a:rPr lang="en-US" sz="1400" baseline="-25000" dirty="0">
+                <a:latin typeface="Arial" panose="020B0604020202020204" pitchFamily="34" charset="0"/>
+                <a:cs typeface="Arial" panose="020B0604020202020204" pitchFamily="34" charset="0"/>
+              </a:rPr>
+              <a:t>10</a:t>
+            </a:r>
+            <a:r>
+              <a:rPr lang="en-US" sz="1400" dirty="0">
+                <a:latin typeface="Arial" panose="020B0604020202020204" pitchFamily="34" charset="0"/>
+                <a:cs typeface="Arial" panose="020B0604020202020204" pitchFamily="34" charset="0"/>
+              </a:rPr>
+              <a:t>(</a:t>
+            </a:r>
+            <a:r>
+              <a:rPr lang="en-US" sz="1400" dirty="0" err="1">
+                <a:latin typeface="Arial" panose="020B0604020202020204" pitchFamily="34" charset="0"/>
+                <a:cs typeface="Arial" panose="020B0604020202020204" pitchFamily="34" charset="0"/>
+              </a:rPr>
+              <a:t>NumVoxels</a:t>
+            </a:r>
+            <a:r>
+              <a:rPr lang="en-US" sz="1400" dirty="0">
+                <a:latin typeface="Arial" panose="020B0604020202020204" pitchFamily="34" charset="0"/>
+                <a:cs typeface="Arial" panose="020B0604020202020204" pitchFamily="34" charset="0"/>
+              </a:rPr>
+              <a:t>)</a:t>
+            </a:r>
+            <a:endParaRPr lang="en-US" sz="1400" dirty="0"/>
           </a:p>
         </p:txBody>
       </p:sp>
@@ -4358,6 +4871,270 @@
     <p:extLst>
       <p:ext uri="{BB962C8B-B14F-4D97-AF65-F5344CB8AC3E}">
         <p14:creationId xmlns:p14="http://schemas.microsoft.com/office/powerpoint/2010/main" val="103463517"/>
+      </p:ext>
+    </p:extLst>
+  </p:cSld>
+  <p:clrMapOvr>
+    <a:masterClrMapping/>
+  </p:clrMapOvr>
+</p:sld>
+</file>
+
+<file path=ppt/slides/slide5.xml><?xml version="1.0" encoding="utf-8"?>
+<p:sld xmlns:a="http://schemas.openxmlformats.org/drawingml/2006/main" xmlns:r="http://schemas.openxmlformats.org/officeDocument/2006/relationships" xmlns:p="http://schemas.openxmlformats.org/presentationml/2006/main">
+  <p:cSld>
+    <p:spTree>
+      <p:nvGrpSpPr>
+        <p:cNvPr id="1" name=""/>
+        <p:cNvGrpSpPr/>
+        <p:nvPr/>
+      </p:nvGrpSpPr>
+      <p:grpSpPr>
+        <a:xfrm>
+          <a:off x="0" y="0"/>
+          <a:ext cx="0" cy="0"/>
+          <a:chOff x="0" y="0"/>
+          <a:chExt cx="0" cy="0"/>
+        </a:xfrm>
+      </p:grpSpPr>
+      <p:pic>
+        <p:nvPicPr>
+          <p:cNvPr id="9" name="Picture 8">
+            <a:extLst>
+              <a:ext uri="{FF2B5EF4-FFF2-40B4-BE49-F238E27FC236}">
+                <a16:creationId xmlns:a16="http://schemas.microsoft.com/office/drawing/2014/main" id="{54C76181-F7CC-4904-8378-CCD9CE4B3790}"/>
+              </a:ext>
+            </a:extLst>
+          </p:cNvPr>
+          <p:cNvPicPr>
+            <a:picLocks noChangeAspect="1"/>
+          </p:cNvPicPr>
+          <p:nvPr/>
+        </p:nvPicPr>
+        <p:blipFill>
+          <a:blip r:embed="rId2">
+            <a:extLst>
+              <a:ext uri="{28A0092B-C50C-407E-A947-70E740481C1C}">
+                <a14:useLocalDpi xmlns:a14="http://schemas.microsoft.com/office/drawing/2010/main" val="0"/>
+              </a:ext>
+            </a:extLst>
+          </a:blip>
+          <a:stretch>
+            <a:fillRect/>
+          </a:stretch>
+        </p:blipFill>
+        <p:spPr>
+          <a:xfrm>
+            <a:off x="425576" y="79656"/>
+            <a:ext cx="6622777" cy="5208814"/>
+          </a:xfrm>
+          <a:prstGeom prst="rect">
+            <a:avLst/>
+          </a:prstGeom>
+        </p:spPr>
+      </p:pic>
+      <p:pic>
+        <p:nvPicPr>
+          <p:cNvPr id="2" name="Picture 1">
+            <a:extLst>
+              <a:ext uri="{FF2B5EF4-FFF2-40B4-BE49-F238E27FC236}">
+                <a16:creationId xmlns:a16="http://schemas.microsoft.com/office/drawing/2014/main" id="{1ECF7B2C-62C4-4720-9ADD-1F41DC257B20}"/>
+              </a:ext>
+            </a:extLst>
+          </p:cNvPr>
+          <p:cNvPicPr>
+            <a:picLocks noChangeAspect="1"/>
+          </p:cNvPicPr>
+          <p:nvPr/>
+        </p:nvPicPr>
+        <p:blipFill rotWithShape="1">
+          <a:blip r:embed="rId3">
+            <a:extLst>
+              <a:ext uri="{28A0092B-C50C-407E-A947-70E740481C1C}">
+                <a14:useLocalDpi xmlns:a14="http://schemas.microsoft.com/office/drawing/2010/main" val="0"/>
+              </a:ext>
+            </a:extLst>
+          </a:blip>
+          <a:srcRect l="9615" t="5479" r="8232" b="6729"/>
+          <a:stretch/>
+        </p:blipFill>
+        <p:spPr>
+          <a:xfrm>
+            <a:off x="6868886" y="406298"/>
+            <a:ext cx="5323114" cy="4474029"/>
+          </a:xfrm>
+          <a:prstGeom prst="rect">
+            <a:avLst/>
+          </a:prstGeom>
+        </p:spPr>
+      </p:pic>
+      <p:sp>
+        <p:nvSpPr>
+          <p:cNvPr id="5" name="TextBox 4">
+            <a:extLst>
+              <a:ext uri="{FF2B5EF4-FFF2-40B4-BE49-F238E27FC236}">
+                <a16:creationId xmlns:a16="http://schemas.microsoft.com/office/drawing/2014/main" id="{2B086EBF-FA6C-4D3D-AA3A-DCCC2BD1CE48}"/>
+              </a:ext>
+            </a:extLst>
+          </p:cNvPr>
+          <p:cNvSpPr txBox="1"/>
+          <p:nvPr/>
+        </p:nvSpPr>
+        <p:spPr>
+          <a:xfrm>
+            <a:off x="1014959" y="-46468"/>
+            <a:ext cx="385042" cy="523220"/>
+          </a:xfrm>
+          <a:prstGeom prst="rect">
+            <a:avLst/>
+          </a:prstGeom>
+          <a:noFill/>
+        </p:spPr>
+        <p:txBody>
+          <a:bodyPr wrap="none" rtlCol="0">
+            <a:spAutoFit/>
+          </a:bodyPr>
+          <a:lstStyle/>
+          <a:p>
+            <a:r>
+              <a:rPr lang="en-US" sz="2800" dirty="0">
+                <a:latin typeface="Arial" panose="020B0604020202020204" pitchFamily="34" charset="0"/>
+                <a:cs typeface="Arial" panose="020B0604020202020204" pitchFamily="34" charset="0"/>
+              </a:rPr>
+              <a:t>a</a:t>
+            </a:r>
+          </a:p>
+        </p:txBody>
+      </p:sp>
+      <p:sp>
+        <p:nvSpPr>
+          <p:cNvPr id="6" name="TextBox 5">
+            <a:extLst>
+              <a:ext uri="{FF2B5EF4-FFF2-40B4-BE49-F238E27FC236}">
+                <a16:creationId xmlns:a16="http://schemas.microsoft.com/office/drawing/2014/main" id="{72959BB4-8BB3-44D1-92A0-E6611CC278CD}"/>
+              </a:ext>
+            </a:extLst>
+          </p:cNvPr>
+          <p:cNvSpPr txBox="1"/>
+          <p:nvPr/>
+        </p:nvSpPr>
+        <p:spPr>
+          <a:xfrm>
+            <a:off x="6825247" y="-46468"/>
+            <a:ext cx="380896" cy="523220"/>
+          </a:xfrm>
+          <a:prstGeom prst="rect">
+            <a:avLst/>
+          </a:prstGeom>
+          <a:noFill/>
+        </p:spPr>
+        <p:txBody>
+          <a:bodyPr wrap="square" rtlCol="0">
+            <a:spAutoFit/>
+          </a:bodyPr>
+          <a:lstStyle/>
+          <a:p>
+            <a:r>
+              <a:rPr lang="en-US" sz="2800" dirty="0">
+                <a:latin typeface="Arial" panose="020B0604020202020204" pitchFamily="34" charset="0"/>
+                <a:cs typeface="Arial" panose="020B0604020202020204" pitchFamily="34" charset="0"/>
+              </a:rPr>
+              <a:t>b</a:t>
+            </a:r>
+          </a:p>
+        </p:txBody>
+      </p:sp>
+      <p:sp>
+        <p:nvSpPr>
+          <p:cNvPr id="7" name="TextBox 6">
+            <a:extLst>
+              <a:ext uri="{FF2B5EF4-FFF2-40B4-BE49-F238E27FC236}">
+                <a16:creationId xmlns:a16="http://schemas.microsoft.com/office/drawing/2014/main" id="{48C7BC6D-0569-4E59-BDC4-E80BBCEEB617}"/>
+              </a:ext>
+            </a:extLst>
+          </p:cNvPr>
+          <p:cNvSpPr txBox="1"/>
+          <p:nvPr/>
+        </p:nvSpPr>
+        <p:spPr>
+          <a:xfrm>
+            <a:off x="3199818" y="-46468"/>
+            <a:ext cx="1544012" cy="523220"/>
+          </a:xfrm>
+          <a:prstGeom prst="rect">
+            <a:avLst/>
+          </a:prstGeom>
+          <a:noFill/>
+        </p:spPr>
+        <p:txBody>
+          <a:bodyPr wrap="none" rtlCol="0">
+            <a:spAutoFit/>
+          </a:bodyPr>
+          <a:lstStyle/>
+          <a:p>
+            <a:r>
+              <a:rPr lang="en-US" sz="2800" dirty="0" err="1">
+                <a:latin typeface="Arial" panose="020B0604020202020204" pitchFamily="34" charset="0"/>
+                <a:cs typeface="Arial" panose="020B0604020202020204" pitchFamily="34" charset="0"/>
+              </a:rPr>
+              <a:t>MicroCT</a:t>
+            </a:r>
+            <a:endParaRPr lang="en-US" sz="2800" dirty="0">
+              <a:latin typeface="Arial" panose="020B0604020202020204" pitchFamily="34" charset="0"/>
+              <a:cs typeface="Arial" panose="020B0604020202020204" pitchFamily="34" charset="0"/>
+            </a:endParaRPr>
+          </a:p>
+        </p:txBody>
+      </p:sp>
+      <p:sp>
+        <p:nvSpPr>
+          <p:cNvPr id="8" name="TextBox 7">
+            <a:extLst>
+              <a:ext uri="{FF2B5EF4-FFF2-40B4-BE49-F238E27FC236}">
+                <a16:creationId xmlns:a16="http://schemas.microsoft.com/office/drawing/2014/main" id="{E74C5D84-C5C0-42F0-A05F-622C5BE1F2CD}"/>
+              </a:ext>
+            </a:extLst>
+          </p:cNvPr>
+          <p:cNvSpPr txBox="1"/>
+          <p:nvPr/>
+        </p:nvSpPr>
+        <p:spPr>
+          <a:xfrm>
+            <a:off x="8867754" y="-46468"/>
+            <a:ext cx="1662635" cy="523220"/>
+          </a:xfrm>
+          <a:prstGeom prst="rect">
+            <a:avLst/>
+          </a:prstGeom>
+          <a:noFill/>
+        </p:spPr>
+        <p:txBody>
+          <a:bodyPr wrap="none" rtlCol="0">
+            <a:spAutoFit/>
+          </a:bodyPr>
+          <a:lstStyle/>
+          <a:p>
+            <a:r>
+              <a:rPr lang="en-US" sz="2800" dirty="0" err="1">
+                <a:latin typeface="Arial" panose="020B0604020202020204" pitchFamily="34" charset="0"/>
+                <a:cs typeface="Arial" panose="020B0604020202020204" pitchFamily="34" charset="0"/>
+              </a:rPr>
+              <a:t>Hr</a:t>
+            </a:r>
+            <a:r>
+              <a:rPr lang="en-US" sz="2800" dirty="0">
+                <a:latin typeface="Arial" panose="020B0604020202020204" pitchFamily="34" charset="0"/>
+                <a:cs typeface="Arial" panose="020B0604020202020204" pitchFamily="34" charset="0"/>
+              </a:rPr>
+              <a:t>-CBCT</a:t>
+            </a:r>
+          </a:p>
+        </p:txBody>
+      </p:sp>
+    </p:spTree>
+    <p:extLst>
+      <p:ext uri="{BB962C8B-B14F-4D97-AF65-F5344CB8AC3E}">
+        <p14:creationId xmlns:p14="http://schemas.microsoft.com/office/powerpoint/2010/main" val="2540455914"/>
       </p:ext>
     </p:extLst>
   </p:cSld>

</xml_diff>